<commit_message>
first integration of new images
</commit_message>
<xml_diff>
--- a/images/ppt/TAS Scientific-Impact-Oct-2014-2.0-v3.pptx
+++ b/images/ppt/TAS Scientific-Impact-Oct-2014-2.0-v3.pptx
@@ -148,7 +148,7 @@
   </p:defaultTextStyle>
   <p:extLst>
     <p:ext uri="{EFAFB233-063F-42B5-8137-9DF3F51BA10A}">
-      <p15:sldGuideLst xmlns:p15="http://schemas.microsoft.com/office/powerpoint/2012/main" xmlns="">
+      <p15:sldGuideLst xmlns="" xmlns:p15="http://schemas.microsoft.com/office/powerpoint/2012/main">
         <p15:guide id="1" orient="horz" pos="2160">
           <p15:clr>
             <a:srgbClr val="A4A3A4"/>
@@ -473,7 +473,7 @@
           <a:p>
             <a:fld id="{C9448E7E-BF38-AA4D-9ACD-A131BF812C78}" type="datetimeFigureOut">
               <a:rPr lang="en-US" smtClean="0"/>
-              <a:t>10/5/14</a:t>
+              <a:t>4/3/15</a:t>
             </a:fld>
             <a:endParaRPr lang="en-US"/>
           </a:p>
@@ -3367,7 +3367,7 @@
           <a:p>
             <a:fld id="{9249E6AE-4DB5-B44C-A9AE-3E93A4B88DAA}" type="datetimeFigureOut">
               <a:rPr lang="en-US" smtClean="0"/>
-              <a:t>10/5/14</a:t>
+              <a:t>4/3/15</a:t>
             </a:fld>
             <a:endParaRPr lang="en-US"/>
           </a:p>
@@ -3567,7 +3567,7 @@
           <a:p>
             <a:fld id="{9249E6AE-4DB5-B44C-A9AE-3E93A4B88DAA}" type="datetimeFigureOut">
               <a:rPr lang="en-US" smtClean="0"/>
-              <a:t>10/5/14</a:t>
+              <a:t>4/3/15</a:t>
             </a:fld>
             <a:endParaRPr lang="en-US"/>
           </a:p>
@@ -3742,7 +3742,7 @@
           <a:p>
             <a:fld id="{9249E6AE-4DB5-B44C-A9AE-3E93A4B88DAA}" type="datetimeFigureOut">
               <a:rPr lang="en-US" smtClean="0"/>
-              <a:t>10/5/14</a:t>
+              <a:t>4/3/15</a:t>
             </a:fld>
             <a:endParaRPr lang="en-US"/>
           </a:p>
@@ -4181,7 +4181,7 @@
           <a:p>
             <a:fld id="{9249E6AE-4DB5-B44C-A9AE-3E93A4B88DAA}" type="datetimeFigureOut">
               <a:rPr lang="en-US" smtClean="0"/>
-              <a:t>10/5/14</a:t>
+              <a:t>4/3/15</a:t>
             </a:fld>
             <a:endParaRPr lang="en-US"/>
           </a:p>
@@ -4429,7 +4429,7 @@
           <a:p>
             <a:fld id="{9249E6AE-4DB5-B44C-A9AE-3E93A4B88DAA}" type="datetimeFigureOut">
               <a:rPr lang="en-US" smtClean="0"/>
-              <a:t>10/5/14</a:t>
+              <a:t>4/3/15</a:t>
             </a:fld>
             <a:endParaRPr lang="en-US"/>
           </a:p>
@@ -4747,7 +4747,7 @@
           <a:p>
             <a:fld id="{9249E6AE-4DB5-B44C-A9AE-3E93A4B88DAA}" type="datetimeFigureOut">
               <a:rPr lang="en-US" smtClean="0"/>
-              <a:t>10/5/14</a:t>
+              <a:t>4/3/15</a:t>
             </a:fld>
             <a:endParaRPr lang="en-US"/>
           </a:p>
@@ -5213,7 +5213,7 @@
           <a:p>
             <a:fld id="{9249E6AE-4DB5-B44C-A9AE-3E93A4B88DAA}" type="datetimeFigureOut">
               <a:rPr lang="en-US" smtClean="0"/>
-              <a:t>10/5/14</a:t>
+              <a:t>4/3/15</a:t>
             </a:fld>
             <a:endParaRPr lang="en-US"/>
           </a:p>
@@ -5361,7 +5361,7 @@
           <a:p>
             <a:fld id="{9249E6AE-4DB5-B44C-A9AE-3E93A4B88DAA}" type="datetimeFigureOut">
               <a:rPr lang="en-US" smtClean="0"/>
-              <a:t>10/5/14</a:t>
+              <a:t>4/3/15</a:t>
             </a:fld>
             <a:endParaRPr lang="en-US"/>
           </a:p>
@@ -5451,7 +5451,7 @@
           <a:p>
             <a:fld id="{9249E6AE-4DB5-B44C-A9AE-3E93A4B88DAA}" type="datetimeFigureOut">
               <a:rPr lang="en-US" smtClean="0"/>
-              <a:t>10/5/14</a:t>
+              <a:t>4/3/15</a:t>
             </a:fld>
             <a:endParaRPr lang="en-US"/>
           </a:p>
@@ -5725,7 +5725,7 @@
           <a:p>
             <a:fld id="{9249E6AE-4DB5-B44C-A9AE-3E93A4B88DAA}" type="datetimeFigureOut">
               <a:rPr lang="en-US" smtClean="0"/>
-              <a:t>10/5/14</a:t>
+              <a:t>4/3/15</a:t>
             </a:fld>
             <a:endParaRPr lang="en-US"/>
           </a:p>
@@ -6030,7 +6030,7 @@
           <a:p>
             <a:fld id="{9249E6AE-4DB5-B44C-A9AE-3E93A4B88DAA}" type="datetimeFigureOut">
               <a:rPr lang="en-US" smtClean="0"/>
-              <a:t>10/5/14</a:t>
+              <a:t>4/3/15</a:t>
             </a:fld>
             <a:endParaRPr lang="en-US"/>
           </a:p>
@@ -6282,7 +6282,7 @@
           <a:p>
             <a:fld id="{9249E6AE-4DB5-B44C-A9AE-3E93A4B88DAA}" type="datetimeFigureOut">
               <a:rPr lang="en-US" smtClean="0"/>
-              <a:t>10/5/14</a:t>
+              <a:t>4/3/15</a:t>
             </a:fld>
             <a:endParaRPr lang="en-US"/>
           </a:p>
@@ -6362,169 +6362,6 @@
           </a:p>
         </p:txBody>
       </p:sp>
-      <p:pic>
-        <p:nvPicPr>
-          <p:cNvPr id="12" name="Picture 11"/>
-          <p:cNvPicPr>
-            <a:picLocks noChangeAspect="1"/>
-          </p:cNvPicPr>
-          <p:nvPr userDrawn="1"/>
-        </p:nvPicPr>
-        <p:blipFill>
-          <a:blip r:embed="rId14" cstate="screen">
-            <a:extLst>
-              <a:ext uri="{28A0092B-C50C-407E-A947-70E740481C1C}">
-                <a14:useLocalDpi xmlns:a14="http://schemas.microsoft.com/office/drawing/2010/main"/>
-              </a:ext>
-            </a:extLst>
-          </a:blip>
-          <a:stretch>
-            <a:fillRect/>
-          </a:stretch>
-        </p:blipFill>
-        <p:spPr>
-          <a:xfrm>
-            <a:off x="67027" y="6377820"/>
-            <a:ext cx="462471" cy="465257"/>
-          </a:xfrm>
-          <a:prstGeom prst="rect">
-            <a:avLst/>
-          </a:prstGeom>
-        </p:spPr>
-      </p:pic>
-      <p:pic>
-        <p:nvPicPr>
-          <p:cNvPr id="13" name="Picture 12" descr="xdmod_logo.png"/>
-          <p:cNvPicPr>
-            <a:picLocks noChangeAspect="1"/>
-          </p:cNvPicPr>
-          <p:nvPr userDrawn="1"/>
-        </p:nvPicPr>
-        <p:blipFill>
-          <a:blip r:embed="rId15" cstate="screen">
-            <a:extLst>
-              <a:ext uri="{28A0092B-C50C-407E-A947-70E740481C1C}">
-                <a14:useLocalDpi xmlns:a14="http://schemas.microsoft.com/office/drawing/2010/main"/>
-              </a:ext>
-            </a:extLst>
-          </a:blip>
-          <a:stretch>
-            <a:fillRect/>
-          </a:stretch>
-        </p:blipFill>
-        <p:spPr>
-          <a:xfrm>
-            <a:off x="7402285" y="6362896"/>
-            <a:ext cx="1588401" cy="495104"/>
-          </a:xfrm>
-          <a:prstGeom prst="rect">
-            <a:avLst/>
-          </a:prstGeom>
-        </p:spPr>
-      </p:pic>
-      <p:sp>
-        <p:nvSpPr>
-          <p:cNvPr id="14" name="TextBox 13"/>
-          <p:cNvSpPr txBox="1"/>
-          <p:nvPr userDrawn="1"/>
-        </p:nvSpPr>
-        <p:spPr>
-          <a:xfrm>
-            <a:off x="2432081" y="6456560"/>
-            <a:ext cx="3877582" cy="307777"/>
-          </a:xfrm>
-          <a:prstGeom prst="rect">
-            <a:avLst/>
-          </a:prstGeom>
-          <a:noFill/>
-        </p:spPr>
-        <p:txBody>
-          <a:bodyPr wrap="square" rtlCol="0">
-            <a:spAutoFit/>
-          </a:bodyPr>
-          <a:lstStyle/>
-          <a:p>
-            <a:pPr algn="ctr"/>
-            <a:r>
-              <a:rPr lang="en-US" sz="1400" spc="300" dirty="0" smtClean="0"/>
-              <a:t>TECHNOLOGY</a:t>
-            </a:r>
-            <a:r>
-              <a:rPr lang="en-US" sz="1400" spc="300" baseline="0" dirty="0" smtClean="0"/>
-              <a:t> AUDIT SERVICE</a:t>
-            </a:r>
-            <a:endParaRPr lang="en-US" sz="1400" spc="300" dirty="0"/>
-          </a:p>
-        </p:txBody>
-      </p:sp>
-      <p:pic>
-        <p:nvPicPr>
-          <p:cNvPr id="15" name="Picture 14"/>
-          <p:cNvPicPr>
-            <a:picLocks noChangeAspect="1"/>
-          </p:cNvPicPr>
-          <p:nvPr userDrawn="1"/>
-        </p:nvPicPr>
-        <p:blipFill>
-          <a:blip r:embed="rId16" cstate="screen">
-            <a:extLst>
-              <a:ext uri="{28A0092B-C50C-407E-A947-70E740481C1C}">
-                <a14:useLocalDpi xmlns:a14="http://schemas.microsoft.com/office/drawing/2010/main"/>
-              </a:ext>
-            </a:extLst>
-          </a:blip>
-          <a:stretch>
-            <a:fillRect/>
-          </a:stretch>
-        </p:blipFill>
-        <p:spPr>
-          <a:xfrm>
-            <a:off x="2101101" y="6480082"/>
-            <a:ext cx="656863" cy="361024"/>
-          </a:xfrm>
-          <a:prstGeom prst="rect">
-            <a:avLst/>
-          </a:prstGeom>
-        </p:spPr>
-      </p:pic>
-      <p:pic>
-        <p:nvPicPr>
-          <p:cNvPr id="16" name="Picture 15" descr="Screen Shot 2014-07-15 at 11.13.42 AM.png"/>
-          <p:cNvPicPr>
-            <a:picLocks noChangeAspect="1"/>
-          </p:cNvPicPr>
-          <p:nvPr userDrawn="1"/>
-        </p:nvPicPr>
-        <p:blipFill>
-          <a:blip r:embed="rId17">
-            <a:alphaModFix amt="40000"/>
-            <a:extLst>
-              <a:ext uri="{28A0092B-C50C-407E-A947-70E740481C1C}">
-                <a14:useLocalDpi xmlns:a14="http://schemas.microsoft.com/office/drawing/2010/main" val="0"/>
-              </a:ext>
-            </a:extLst>
-          </a:blip>
-          <a:stretch>
-            <a:fillRect/>
-          </a:stretch>
-        </p:blipFill>
-        <p:spPr>
-          <a:xfrm>
-            <a:off x="5961290" y="6451146"/>
-            <a:ext cx="425450" cy="403444"/>
-          </a:xfrm>
-          <a:prstGeom prst="rect">
-            <a:avLst/>
-          </a:prstGeom>
-          <a:effectLst>
-            <a:outerShdw blurRad="50800" dist="38100" dir="2700000" algn="tl" rotWithShape="0">
-              <a:srgbClr val="000000">
-                <a:alpha val="43000"/>
-              </a:srgbClr>
-            </a:outerShdw>
-          </a:effectLst>
-        </p:spPr>
-      </p:pic>
     </p:spTree>
   </p:cSld>
   <p:clrMap bg1="lt1" tx1="dk1" bg2="lt2" tx2="dk2" accent1="accent1" accent2="accent2" accent3="accent3" accent4="accent4" accent5="accent5" accent6="accent6" hlink="hlink" folHlink="folHlink"/>
@@ -6553,7 +6390,7 @@
           <a:solidFill>
             <a:schemeClr val="tx2"/>
           </a:solidFill>
-          <a:latin typeface="Chalkboard"/>
+          <a:latin typeface="+mj-lt"/>
           <a:ea typeface="+mj-ea"/>
           <a:cs typeface="Chalkboard"/>
         </a:defRPr>
@@ -6924,7 +6761,7 @@
                 <a:solidFill>
                   <a:srgbClr val="000090"/>
                 </a:solidFill>
-                <a:latin typeface="Chalkboard"/>
+                <a:latin typeface="+mj-lt"/>
                 <a:cs typeface="Chalkboard"/>
               </a:rPr>
               <a:t>Gregor </a:t>
@@ -6934,7 +6771,7 @@
                 <a:solidFill>
                   <a:srgbClr val="000090"/>
                 </a:solidFill>
-                <a:latin typeface="Chalkboard"/>
+                <a:latin typeface="+mj-lt"/>
                 <a:cs typeface="Chalkboard"/>
               </a:rPr>
               <a:t>von </a:t>
@@ -6944,7 +6781,7 @@
                 <a:solidFill>
                   <a:srgbClr val="000090"/>
                 </a:solidFill>
-                <a:latin typeface="Chalkboard"/>
+                <a:latin typeface="+mj-lt"/>
                 <a:cs typeface="Chalkboard"/>
               </a:rPr>
               <a:t>Laszewski</a:t>
@@ -6954,7 +6791,7 @@
                 <a:solidFill>
                   <a:srgbClr val="000090"/>
                 </a:solidFill>
-                <a:latin typeface="Chalkboard"/>
+                <a:latin typeface="+mj-lt"/>
                 <a:cs typeface="Chalkboard"/>
               </a:rPr>
               <a:t> </a:t>
@@ -6964,7 +6801,7 @@
                 <a:solidFill>
                   <a:srgbClr val="000090"/>
                 </a:solidFill>
-                <a:latin typeface="Chalkboard"/>
+                <a:latin typeface="+mj-lt"/>
                 <a:cs typeface="Chalkboard"/>
               </a:rPr>
               <a:t>and </a:t>
@@ -6974,7 +6811,7 @@
                 <a:solidFill>
                   <a:srgbClr val="000090"/>
                 </a:solidFill>
-                <a:latin typeface="Chalkboard"/>
+                <a:latin typeface="+mj-lt"/>
                 <a:cs typeface="Chalkboard"/>
               </a:rPr>
               <a:t>Fugang Wang</a:t>
@@ -6983,7 +6820,7 @@
               <a:solidFill>
                 <a:srgbClr val="000090"/>
               </a:solidFill>
-              <a:latin typeface="Chalkboard"/>
+              <a:latin typeface="+mj-lt"/>
               <a:cs typeface="Chalkboard"/>
             </a:endParaRPr>
           </a:p>
@@ -6996,7 +6833,7 @@
                 <a:solidFill>
                   <a:srgbClr val="000090"/>
                 </a:solidFill>
-                <a:latin typeface="Chalkboard"/>
+                <a:latin typeface="+mj-lt"/>
                 <a:cs typeface="Chalkboard"/>
               </a:rPr>
               <a:t>The TAS Team</a:t>
@@ -7011,7 +6848,7 @@
                 <a:solidFill>
                   <a:srgbClr val="000090"/>
                 </a:solidFill>
-                <a:latin typeface="Chalkboard"/>
+                <a:latin typeface="+mj-lt"/>
                 <a:cs typeface="Chalkboard"/>
               </a:rPr>
               <a:t>NSF - October 7</a:t>
@@ -7026,7 +6863,7 @@
                 <a:solidFill>
                   <a:srgbClr val="000090"/>
                 </a:solidFill>
-                <a:latin typeface="Chalkboard"/>
+                <a:latin typeface="+mj-lt"/>
                 <a:cs typeface="Chalkboard"/>
               </a:rPr>
               <a:t>Effort total: 0.6FTE </a:t>
@@ -7035,7 +6872,7 @@
               <a:solidFill>
                 <a:srgbClr val="000090"/>
               </a:solidFill>
-              <a:latin typeface="Chalkboard"/>
+              <a:latin typeface="+mj-lt"/>
               <a:cs typeface="Chalkboard"/>
             </a:endParaRPr>
           </a:p>
@@ -7099,7 +6936,7 @@
         </p:spPr>
         <p:txBody>
           <a:bodyPr>
-            <a:normAutofit fontScale="90000"/>
+            <a:normAutofit/>
           </a:bodyPr>
           <a:lstStyle/>
           <a:p>
@@ -7573,39 +7410,55 @@
               <a:buNone/>
             </a:pPr>
             <a:r>
-              <a:rPr lang="en-US" sz="2000" dirty="0" smtClean="0"/>
+              <a:rPr lang="en-US" sz="2000" dirty="0" smtClean="0">
+                <a:latin typeface="+mj-lt"/>
+              </a:rPr>
               <a:t/>
             </a:r>
             <a:br>
-              <a:rPr lang="en-US" sz="2000" dirty="0" smtClean="0"/>
+              <a:rPr lang="en-US" sz="2000" dirty="0" smtClean="0">
+                <a:latin typeface="+mj-lt"/>
+              </a:rPr>
             </a:br>
             <a:r>
-              <a:rPr lang="en-US" sz="2000" dirty="0"/>
+              <a:rPr lang="en-US" sz="2000" dirty="0">
+                <a:latin typeface="+mj-lt"/>
+              </a:rPr>
               <a:t/>
             </a:r>
             <a:br>
-              <a:rPr lang="en-US" sz="2000" dirty="0"/>
+              <a:rPr lang="en-US" sz="2000" dirty="0">
+                <a:latin typeface="+mj-lt"/>
+              </a:rPr>
             </a:br>
             <a:r>
-              <a:rPr lang="en-US" sz="2000" dirty="0" smtClean="0"/>
+              <a:rPr lang="en-US" sz="2000" dirty="0" smtClean="0">
+                <a:latin typeface="+mj-lt"/>
+              </a:rPr>
               <a:t/>
             </a:r>
             <a:br>
-              <a:rPr lang="en-US" sz="2000" dirty="0" smtClean="0"/>
+              <a:rPr lang="en-US" sz="2000" dirty="0" smtClean="0">
+                <a:latin typeface="+mj-lt"/>
+              </a:rPr>
             </a:br>
             <a:r>
-              <a:rPr lang="en-US" sz="2000" dirty="0"/>
+              <a:rPr lang="en-US" sz="2000" dirty="0">
+                <a:latin typeface="+mj-lt"/>
+              </a:rPr>
               <a:t/>
             </a:r>
             <a:br>
-              <a:rPr lang="en-US" sz="2000" dirty="0"/>
+              <a:rPr lang="en-US" sz="2000" dirty="0">
+                <a:latin typeface="+mj-lt"/>
+              </a:rPr>
             </a:br>
             <a:r>
               <a:rPr lang="en-US" sz="2000" dirty="0" smtClean="0">
                 <a:solidFill>
                   <a:srgbClr val="000090"/>
                 </a:solidFill>
-                <a:latin typeface="Chalkboard"/>
+                <a:latin typeface="+mj-lt"/>
                 <a:cs typeface="Chalkboard"/>
               </a:rPr>
               <a:t>Ex 1: What kind of projects return the most publications and citations?</a:t>
@@ -7615,6 +7468,7 @@
                 <a:solidFill>
                   <a:srgbClr val="000090"/>
                 </a:solidFill>
+                <a:latin typeface="+mj-lt"/>
               </a:rPr>
               <a:t/>
             </a:r>
@@ -7623,28 +7477,41 @@
                 <a:solidFill>
                   <a:srgbClr val="000090"/>
                 </a:solidFill>
+                <a:latin typeface="+mj-lt"/>
               </a:rPr>
             </a:br>
             <a:r>
-              <a:rPr lang="en-US" sz="2000" dirty="0" smtClean="0"/>
+              <a:rPr lang="en-US" sz="2000" dirty="0" smtClean="0">
+                <a:latin typeface="+mj-lt"/>
+              </a:rPr>
               <a:t> </a:t>
             </a:r>
             <a:br>
-              <a:rPr lang="en-US" sz="2000" dirty="0" smtClean="0"/>
+              <a:rPr lang="en-US" sz="2000" dirty="0" smtClean="0">
+                <a:latin typeface="+mj-lt"/>
+              </a:rPr>
             </a:br>
             <a:r>
-              <a:rPr lang="en-US" sz="2000" dirty="0" smtClean="0"/>
+              <a:rPr lang="en-US" sz="2000" dirty="0" smtClean="0">
+                <a:latin typeface="+mj-lt"/>
+              </a:rPr>
               <a:t>			Impact per Allocation </a:t>
             </a:r>
             <a:r>
-              <a:rPr lang="en-US" sz="2000" dirty="0" err="1" smtClean="0"/>
+              <a:rPr lang="en-US" sz="2000" dirty="0" err="1" smtClean="0">
+                <a:latin typeface="+mj-lt"/>
+              </a:rPr>
               <a:t>vs</a:t>
             </a:r>
             <a:r>
-              <a:rPr lang="en-US" sz="2000" dirty="0" smtClean="0"/>
+              <a:rPr lang="en-US" sz="2000" dirty="0" smtClean="0">
+                <a:latin typeface="+mj-lt"/>
+              </a:rPr>
               <a:t> Allocations (by projects)</a:t>
             </a:r>
-            <a:endParaRPr lang="en" sz="2000" dirty="0"/>
+            <a:endParaRPr lang="en" sz="2000" dirty="0">
+              <a:latin typeface="+mj-lt"/>
+            </a:endParaRPr>
           </a:p>
         </p:txBody>
       </p:sp>
@@ -7837,39 +7704,55 @@
               <a:buNone/>
             </a:pPr>
             <a:r>
-              <a:rPr lang="en-US" sz="2000" dirty="0" smtClean="0"/>
+              <a:rPr lang="en-US" sz="2000" dirty="0" smtClean="0">
+                <a:latin typeface="+mj-lt"/>
+              </a:rPr>
               <a:t/>
             </a:r>
             <a:br>
-              <a:rPr lang="en-US" sz="2000" dirty="0" smtClean="0"/>
+              <a:rPr lang="en-US" sz="2000" dirty="0" smtClean="0">
+                <a:latin typeface="+mj-lt"/>
+              </a:rPr>
             </a:br>
             <a:r>
-              <a:rPr lang="en-US" sz="2000" dirty="0"/>
+              <a:rPr lang="en-US" sz="2000" dirty="0">
+                <a:latin typeface="+mj-lt"/>
+              </a:rPr>
               <a:t/>
             </a:r>
             <a:br>
-              <a:rPr lang="en-US" sz="2000" dirty="0"/>
+              <a:rPr lang="en-US" sz="2000" dirty="0">
+                <a:latin typeface="+mj-lt"/>
+              </a:rPr>
             </a:br>
             <a:r>
-              <a:rPr lang="en-US" sz="2000" dirty="0" smtClean="0"/>
+              <a:rPr lang="en-US" sz="2000" dirty="0" smtClean="0">
+                <a:latin typeface="+mj-lt"/>
+              </a:rPr>
               <a:t/>
             </a:r>
             <a:br>
-              <a:rPr lang="en-US" sz="2000" dirty="0" smtClean="0"/>
+              <a:rPr lang="en-US" sz="2000" dirty="0" smtClean="0">
+                <a:latin typeface="+mj-lt"/>
+              </a:rPr>
             </a:br>
             <a:r>
-              <a:rPr lang="en-US" sz="2000" dirty="0"/>
+              <a:rPr lang="en-US" sz="2000" dirty="0">
+                <a:latin typeface="+mj-lt"/>
+              </a:rPr>
               <a:t/>
             </a:r>
             <a:br>
-              <a:rPr lang="en-US" sz="2000" dirty="0"/>
+              <a:rPr lang="en-US" sz="2000" dirty="0">
+                <a:latin typeface="+mj-lt"/>
+              </a:rPr>
             </a:br>
             <a:r>
               <a:rPr lang="en-US" sz="2000" dirty="0" smtClean="0">
                 <a:solidFill>
                   <a:srgbClr val="000090"/>
                 </a:solidFill>
-                <a:latin typeface="Chalkboard"/>
+                <a:latin typeface="+mj-lt"/>
                 <a:cs typeface="Chalkboard"/>
               </a:rPr>
               <a:t>Ex 1: What kind of projects return the most publications and citations?</a:t>
@@ -7879,30 +7762,42 @@
                 <a:solidFill>
                   <a:srgbClr val="000090"/>
                 </a:solidFill>
-                <a:latin typeface="Chalkboard"/>
+                <a:latin typeface="+mj-lt"/>
                 <a:cs typeface="Chalkboard"/>
               </a:rPr>
             </a:br>
             <a:r>
-              <a:rPr lang="en-US" sz="2000" dirty="0" smtClean="0"/>
+              <a:rPr lang="en-US" sz="2000" dirty="0" smtClean="0">
+                <a:latin typeface="+mj-lt"/>
+              </a:rPr>
               <a:t> </a:t>
             </a:r>
             <a:br>
-              <a:rPr lang="en-US" sz="2000" dirty="0" smtClean="0"/>
+              <a:rPr lang="en-US" sz="2000" dirty="0" smtClean="0">
+                <a:latin typeface="+mj-lt"/>
+              </a:rPr>
             </a:br>
             <a:r>
-              <a:rPr lang="en-US" sz="2000" dirty="0" smtClean="0"/>
+              <a:rPr lang="en-US" sz="2000" dirty="0" smtClean="0">
+                <a:latin typeface="+mj-lt"/>
+              </a:rPr>
               <a:t>			Impact per Allocation </a:t>
             </a:r>
             <a:r>
-              <a:rPr lang="en-US" sz="2000" dirty="0" err="1" smtClean="0"/>
+              <a:rPr lang="en-US" sz="2000" dirty="0" err="1" smtClean="0">
+                <a:latin typeface="+mj-lt"/>
+              </a:rPr>
               <a:t>vs</a:t>
             </a:r>
             <a:r>
-              <a:rPr lang="en-US" sz="2000" dirty="0" smtClean="0"/>
+              <a:rPr lang="en-US" sz="2000" dirty="0" smtClean="0">
+                <a:latin typeface="+mj-lt"/>
+              </a:rPr>
               <a:t> Allocations (by projects)</a:t>
             </a:r>
-            <a:endParaRPr lang="en" sz="2000" dirty="0"/>
+            <a:endParaRPr lang="en" sz="2000" dirty="0">
+              <a:latin typeface="+mj-lt"/>
+            </a:endParaRPr>
           </a:p>
         </p:txBody>
       </p:sp>
@@ -8169,7 +8064,7 @@
                 <a:solidFill>
                   <a:srgbClr val="000090"/>
                 </a:solidFill>
-                <a:latin typeface="Chalkboard"/>
+                <a:latin typeface="+mj-lt"/>
                 <a:cs typeface="Chalkboard"/>
               </a:rPr>
               <a:t>Ex 2: Comparing </a:t>
@@ -8179,7 +8074,7 @@
                 <a:solidFill>
                   <a:srgbClr val="000090"/>
                 </a:solidFill>
-                <a:latin typeface="Chalkboard"/>
+                <a:latin typeface="+mj-lt"/>
                 <a:cs typeface="Chalkboard"/>
               </a:rPr>
               <a:t>XSEDE Supported Publications with Peers</a:t>
@@ -8353,7 +8248,7 @@
                 <a:solidFill>
                   <a:srgbClr val="000090"/>
                 </a:solidFill>
-                <a:latin typeface="Chalkboard"/>
+                <a:latin typeface="+mj-lt"/>
                 <a:cs typeface="Chalkboard"/>
               </a:rPr>
               <a:t>Ex 2: Comparing </a:t>
@@ -8363,7 +8258,7 @@
                 <a:solidFill>
                   <a:srgbClr val="000090"/>
                 </a:solidFill>
-                <a:latin typeface="Chalkboard"/>
+                <a:latin typeface="+mj-lt"/>
                 <a:cs typeface="Chalkboard"/>
               </a:rPr>
               <a:t>XSEDE Supported Publications with Peers</a:t>
@@ -8646,11 +8541,7 @@
             <a:pPr lvl="1"/>
             <a:r>
               <a:rPr lang="en-US" sz="1800" dirty="0" smtClean="0"/>
-              <a:t>Compare XSEDE citations to non-XSEDE citations within the same </a:t>
-            </a:r>
-            <a:r>
-              <a:rPr lang="en-US" sz="1800" dirty="0" smtClean="0"/>
-              <a:t>journals</a:t>
+              <a:t>Compare XSEDE citations to non-XSEDE citations within the same journals</a:t>
             </a:r>
           </a:p>
           <a:p>
@@ -9620,7 +9511,7 @@
                 <a:solidFill>
                   <a:srgbClr val="000090"/>
                 </a:solidFill>
-                <a:latin typeface="Chalkboard"/>
+                <a:latin typeface="+mj-lt"/>
                 <a:cs typeface="Chalkboard"/>
               </a:rPr>
               <a:t>Why Evaluate Scientific Impact?</a:t>
@@ -9629,7 +9520,7 @@
               <a:solidFill>
                 <a:srgbClr val="000090"/>
               </a:solidFill>
-              <a:latin typeface="Chalkboard"/>
+              <a:latin typeface="+mj-lt"/>
               <a:cs typeface="Chalkboard"/>
             </a:endParaRPr>
           </a:p>
@@ -13377,20 +13268,22 @@
         </p:nvSpPr>
         <p:spPr>
           <a:xfrm>
-            <a:off x="111192" y="152747"/>
+            <a:off x="618907" y="152747"/>
             <a:ext cx="3129579" cy="990600"/>
           </a:xfrm>
         </p:spPr>
         <p:txBody>
-          <a:bodyPr/>
+          <a:bodyPr>
+            <a:normAutofit/>
+          </a:bodyPr>
           <a:lstStyle/>
           <a:p>
             <a:pPr algn="l"/>
             <a:r>
-              <a:rPr lang="en-US" dirty="0" smtClean="0"/>
+              <a:rPr lang="en-US" sz="2400" dirty="0" smtClean="0"/>
               <a:t>Objectives</a:t>
             </a:r>
-            <a:endParaRPr lang="en-US" dirty="0"/>
+            <a:endParaRPr lang="en-US" sz="2400" dirty="0"/>
           </a:p>
         </p:txBody>
       </p:sp>
@@ -16659,7 +16552,6 @@
               <a:rPr lang="en-US" dirty="0"/>
               <a:t>In most journal issues XSEDE publications count less than 5%, with some number of issues the ratio goes to 5%~10%, while for very few issues (a dozen or so out of the 3.6K issues involved) it has more than 10%.</a:t>
             </a:r>
-            <a:endParaRPr lang="en-US" dirty="0"/>
           </a:p>
         </p:txBody>
       </p:sp>
@@ -16863,7 +16755,7 @@
                 <a:solidFill>
                   <a:srgbClr val="000090"/>
                 </a:solidFill>
-                <a:latin typeface="Chalkboard"/>
+                <a:latin typeface="+mj-lt"/>
                 <a:cs typeface="Chalkboard"/>
               </a:rPr>
               <a:t>Background and Related Efforts</a:t>
@@ -16872,7 +16764,7 @@
               <a:solidFill>
                 <a:srgbClr val="000090"/>
               </a:solidFill>
-              <a:latin typeface="Chalkboard"/>
+              <a:latin typeface="+mj-lt"/>
               <a:cs typeface="Chalkboard"/>
             </a:endParaRPr>
           </a:p>
@@ -17253,7 +17145,7 @@
                 <a:solidFill>
                   <a:srgbClr val="000090"/>
                 </a:solidFill>
-                <a:latin typeface="Chalkboard"/>
+                <a:latin typeface="+mj-lt"/>
                 <a:cs typeface="Chalkboard"/>
               </a:rPr>
               <a:t>Approach </a:t>
@@ -17262,7 +17154,7 @@
               <a:solidFill>
                 <a:srgbClr val="000090"/>
               </a:solidFill>
-              <a:latin typeface="Chalkboard"/>
+              <a:latin typeface="+mj-lt"/>
               <a:cs typeface="Chalkboard"/>
             </a:endParaRPr>
           </a:p>
@@ -17482,7 +17374,7 @@
                 <a:solidFill>
                   <a:srgbClr val="000090"/>
                 </a:solidFill>
-                <a:latin typeface="Chalkboard"/>
+                <a:latin typeface="+mj-lt"/>
                 <a:cs typeface="Chalkboard"/>
               </a:rPr>
               <a:t>Data Acquired – publication data</a:t>
@@ -17491,7 +17383,7 @@
               <a:solidFill>
                 <a:srgbClr val="000090"/>
               </a:solidFill>
-              <a:latin typeface="Chalkboard"/>
+              <a:latin typeface="+mj-lt"/>
               <a:cs typeface="Chalkboard"/>
             </a:endParaRPr>
           </a:p>
@@ -18137,8 +18029,8 @@
         </p:nvSpPr>
         <p:spPr>
           <a:xfrm>
-            <a:off x="44198" y="556980"/>
-            <a:ext cx="7017001" cy="4617362"/>
+            <a:off x="44198" y="508000"/>
+            <a:ext cx="7017001" cy="4666342"/>
           </a:xfrm>
           <a:prstGeom prst="rect">
             <a:avLst/>
@@ -19770,40 +19662,26 @@
             </a:pPr>
             <a:r>
               <a:rPr lang="en-US" dirty="0" smtClean="0">
-                <a:latin typeface="Chalkboard SE Regular"/>
+                <a:latin typeface="+mj-lt"/>
                 <a:cs typeface="Chalkboard SE Regular"/>
               </a:rPr>
               <a:t>XSEDE related Data Acquisition  </a:t>
             </a:r>
             <a:br>
               <a:rPr lang="en-US" dirty="0" smtClean="0">
-                <a:latin typeface="Chalkboard SE Regular"/>
+                <a:latin typeface="+mj-lt"/>
                 <a:cs typeface="Chalkboard SE Regular"/>
               </a:rPr>
             </a:br>
             <a:r>
               <a:rPr lang="en-US" dirty="0" smtClean="0">
-                <a:latin typeface="Chalkboard SE Regular"/>
+                <a:latin typeface="+mj-lt"/>
                 <a:cs typeface="Chalkboard SE Regular"/>
               </a:rPr>
-              <a:t>         </a:t>
-            </a:r>
-            <a:r>
-              <a:rPr lang="en-US" dirty="0" smtClean="0">
-                <a:latin typeface="Chalkboard SE Regular"/>
-                <a:cs typeface="Chalkboard SE Regular"/>
-              </a:rPr>
-              <a:t>. . .</a:t>
-            </a:r>
-            <a:r>
-              <a:rPr lang="en-US" dirty="0" smtClean="0">
-                <a:latin typeface="Chalkboard SE Regular"/>
-                <a:cs typeface="Chalkboard SE Regular"/>
-              </a:rPr>
-              <a:t> an ongoing process</a:t>
+              <a:t>         . . . an ongoing process</a:t>
             </a:r>
             <a:endParaRPr lang="en" dirty="0">
-              <a:latin typeface="Chalkboard SE Regular"/>
+              <a:latin typeface="+mj-lt"/>
               <a:cs typeface="Chalkboard SE Regular"/>
             </a:endParaRPr>
           </a:p>

</xml_diff>